<commit_message>
[수정] todoPage db컬럼 설계, todoPage 컴포넌트 재정의, todoCreatePage 핸들러 추가
</commit_message>
<xml_diff>
--- a/documents/화면설계서/20220808_TodoList(v0.5).pptx
+++ b/documents/화면설계서/20220808_TodoList(v0.5).pptx
@@ -12,6 +12,7 @@
     <p:sldId id="262" r:id="rId6"/>
     <p:sldId id="264" r:id="rId7"/>
     <p:sldId id="265" r:id="rId8"/>
+    <p:sldId id="266" r:id="rId9"/>
   </p:sldIdLst>
   <p:sldSz cx="12192000" cy="6858000"/>
   <p:notesSz cx="6858000" cy="9144000"/>
@@ -265,7 +266,7 @@
           <a:p>
             <a:fld id="{5898F278-28E9-444D-B2B1-B7A14FF35FDF}" type="datetimeFigureOut">
               <a:rPr lang="ko-KR" altLang="en-US" smtClean="0"/>
-              <a:t>2022-08-08</a:t>
+              <a:t>2022-08-09</a:t>
             </a:fld>
             <a:endParaRPr lang="ko-KR" altLang="en-US"/>
           </a:p>
@@ -463,7 +464,7 @@
           <a:p>
             <a:fld id="{5898F278-28E9-444D-B2B1-B7A14FF35FDF}" type="datetimeFigureOut">
               <a:rPr lang="ko-KR" altLang="en-US" smtClean="0"/>
-              <a:t>2022-08-08</a:t>
+              <a:t>2022-08-09</a:t>
             </a:fld>
             <a:endParaRPr lang="ko-KR" altLang="en-US"/>
           </a:p>
@@ -671,7 +672,7 @@
           <a:p>
             <a:fld id="{5898F278-28E9-444D-B2B1-B7A14FF35FDF}" type="datetimeFigureOut">
               <a:rPr lang="ko-KR" altLang="en-US" smtClean="0"/>
-              <a:t>2022-08-08</a:t>
+              <a:t>2022-08-09</a:t>
             </a:fld>
             <a:endParaRPr lang="ko-KR" altLang="en-US"/>
           </a:p>
@@ -869,7 +870,7 @@
           <a:p>
             <a:fld id="{5898F278-28E9-444D-B2B1-B7A14FF35FDF}" type="datetimeFigureOut">
               <a:rPr lang="ko-KR" altLang="en-US" smtClean="0"/>
-              <a:t>2022-08-08</a:t>
+              <a:t>2022-08-09</a:t>
             </a:fld>
             <a:endParaRPr lang="ko-KR" altLang="en-US"/>
           </a:p>
@@ -1144,7 +1145,7 @@
           <a:p>
             <a:fld id="{5898F278-28E9-444D-B2B1-B7A14FF35FDF}" type="datetimeFigureOut">
               <a:rPr lang="ko-KR" altLang="en-US" smtClean="0"/>
-              <a:t>2022-08-08</a:t>
+              <a:t>2022-08-09</a:t>
             </a:fld>
             <a:endParaRPr lang="ko-KR" altLang="en-US"/>
           </a:p>
@@ -1409,7 +1410,7 @@
           <a:p>
             <a:fld id="{5898F278-28E9-444D-B2B1-B7A14FF35FDF}" type="datetimeFigureOut">
               <a:rPr lang="ko-KR" altLang="en-US" smtClean="0"/>
-              <a:t>2022-08-08</a:t>
+              <a:t>2022-08-09</a:t>
             </a:fld>
             <a:endParaRPr lang="ko-KR" altLang="en-US"/>
           </a:p>
@@ -1821,7 +1822,7 @@
           <a:p>
             <a:fld id="{5898F278-28E9-444D-B2B1-B7A14FF35FDF}" type="datetimeFigureOut">
               <a:rPr lang="ko-KR" altLang="en-US" smtClean="0"/>
-              <a:t>2022-08-08</a:t>
+              <a:t>2022-08-09</a:t>
             </a:fld>
             <a:endParaRPr lang="ko-KR" altLang="en-US"/>
           </a:p>
@@ -1962,7 +1963,7 @@
           <a:p>
             <a:fld id="{5898F278-28E9-444D-B2B1-B7A14FF35FDF}" type="datetimeFigureOut">
               <a:rPr lang="ko-KR" altLang="en-US" smtClean="0"/>
-              <a:t>2022-08-08</a:t>
+              <a:t>2022-08-09</a:t>
             </a:fld>
             <a:endParaRPr lang="ko-KR" altLang="en-US"/>
           </a:p>
@@ -2075,7 +2076,7 @@
           <a:p>
             <a:fld id="{5898F278-28E9-444D-B2B1-B7A14FF35FDF}" type="datetimeFigureOut">
               <a:rPr lang="ko-KR" altLang="en-US" smtClean="0"/>
-              <a:t>2022-08-08</a:t>
+              <a:t>2022-08-09</a:t>
             </a:fld>
             <a:endParaRPr lang="ko-KR" altLang="en-US"/>
           </a:p>
@@ -2386,7 +2387,7 @@
           <a:p>
             <a:fld id="{5898F278-28E9-444D-B2B1-B7A14FF35FDF}" type="datetimeFigureOut">
               <a:rPr lang="ko-KR" altLang="en-US" smtClean="0"/>
-              <a:t>2022-08-08</a:t>
+              <a:t>2022-08-09</a:t>
             </a:fld>
             <a:endParaRPr lang="ko-KR" altLang="en-US"/>
           </a:p>
@@ -2674,7 +2675,7 @@
           <a:p>
             <a:fld id="{5898F278-28E9-444D-B2B1-B7A14FF35FDF}" type="datetimeFigureOut">
               <a:rPr lang="ko-KR" altLang="en-US" smtClean="0"/>
-              <a:t>2022-08-08</a:t>
+              <a:t>2022-08-09</a:t>
             </a:fld>
             <a:endParaRPr lang="ko-KR" altLang="en-US"/>
           </a:p>
@@ -2915,7 +2916,7 @@
           <a:p>
             <a:fld id="{5898F278-28E9-444D-B2B1-B7A14FF35FDF}" type="datetimeFigureOut">
               <a:rPr lang="ko-KR" altLang="en-US" smtClean="0"/>
-              <a:t>2022-08-08</a:t>
+              <a:t>2022-08-09</a:t>
             </a:fld>
             <a:endParaRPr lang="ko-KR" altLang="en-US"/>
           </a:p>
@@ -3387,6 +3388,12 @@
           <a:lstStyle/>
           <a:p>
             <a:r>
+              <a:rPr lang="en-US" altLang="ko-KR" dirty="0">
+                <a:ea typeface="맑은 고딕"/>
+              </a:rPr>
+              <a:t>1. </a:t>
+            </a:r>
+            <a:r>
               <a:rPr lang="ko-KR" altLang="en-US" dirty="0" err="1">
                 <a:ea typeface="맑은 고딕"/>
               </a:rPr>
@@ -3425,6 +3432,12 @@
           </a:p>
           <a:p>
             <a:r>
+              <a:rPr lang="en-US" altLang="ko-KR" dirty="0">
+                <a:ea typeface="맑은 고딕"/>
+              </a:rPr>
+              <a:t>2. </a:t>
+            </a:r>
+            <a:r>
               <a:rPr lang="ko-KR" altLang="en-US" dirty="0">
                 <a:ea typeface="맑은 고딕"/>
               </a:rPr>
@@ -3454,6 +3467,12 @@
           </a:p>
           <a:p>
             <a:r>
+              <a:rPr lang="en-US" altLang="ko-KR" dirty="0">
+                <a:ea typeface="맑은 고딕"/>
+              </a:rPr>
+              <a:t>3. </a:t>
+            </a:r>
+            <a:r>
               <a:rPr lang="ko-KR" altLang="en-US" dirty="0">
                 <a:ea typeface="맑은 고딕"/>
               </a:rPr>
@@ -3465,8 +3484,17 @@
               </a:rPr>
               <a:t>Page</a:t>
             </a:r>
+            <a:endParaRPr lang="ko-KR" altLang="en-US" dirty="0">
+              <a:ea typeface="맑은 고딕"/>
+            </a:endParaRPr>
           </a:p>
           <a:p>
+            <a:r>
+              <a:rPr lang="en-US" altLang="ko-KR" dirty="0">
+                <a:ea typeface="맑은 고딕"/>
+              </a:rPr>
+              <a:t>4. </a:t>
+            </a:r>
             <a:r>
               <a:rPr lang="ko-KR" altLang="en-US" dirty="0">
                 <a:ea typeface="맑은 고딕"/>
@@ -3484,6 +3512,12 @@
             </a:endParaRPr>
           </a:p>
           <a:p>
+            <a:r>
+              <a:rPr lang="en-US" altLang="ko-KR" dirty="0">
+                <a:ea typeface="맑은 고딕"/>
+              </a:rPr>
+              <a:t>5. </a:t>
+            </a:r>
             <a:r>
               <a:rPr lang="en-US" altLang="ko-KR" dirty="0" err="1">
                 <a:ea typeface="맑은 고딕"/>
@@ -3511,13 +3545,13 @@
               <a:rPr lang="en-US" altLang="ko-KR" dirty="0">
                 <a:ea typeface="맑은 고딕"/>
               </a:rPr>
-              <a:t>YJ-</a:t>
+              <a:t>6. YJ-</a:t>
             </a:r>
             <a:r>
               <a:rPr lang="en-US" altLang="ko-KR" dirty="0" err="1">
                 <a:ea typeface="맑은 고딕"/>
               </a:rPr>
-              <a:t>ToDoList</a:t>
+              <a:t>ToDoPage</a:t>
             </a:r>
             <a:r>
               <a:rPr lang="en-US" altLang="ko-KR" dirty="0">
@@ -3525,6 +3559,62 @@
               </a:rPr>
               <a:t> </a:t>
             </a:r>
+          </a:p>
+          <a:p>
+            <a:r>
+              <a:rPr lang="en-US" altLang="ko-KR" sz="2800" kern="0" dirty="0">
+                <a:solidFill>
+                  <a:prstClr val="black">
+                    <a:lumMod val="75000"/>
+                    <a:lumOff val="25000"/>
+                  </a:prstClr>
+                </a:solidFill>
+              </a:rPr>
+              <a:t>7. YJ-</a:t>
+            </a:r>
+            <a:r>
+              <a:rPr lang="en-US" altLang="ko-KR" sz="2800" kern="0" dirty="0" err="1">
+                <a:solidFill>
+                  <a:prstClr val="black">
+                    <a:lumMod val="75000"/>
+                    <a:lumOff val="25000"/>
+                  </a:prstClr>
+                </a:solidFill>
+              </a:rPr>
+              <a:t>ToDoPage</a:t>
+            </a:r>
+            <a:r>
+              <a:rPr lang="en-US" altLang="ko-KR" sz="2800" kern="0" dirty="0">
+                <a:solidFill>
+                  <a:prstClr val="black">
+                    <a:lumMod val="75000"/>
+                    <a:lumOff val="25000"/>
+                  </a:prstClr>
+                </a:solidFill>
+              </a:rPr>
+              <a:t> </a:t>
+            </a:r>
+            <a:r>
+              <a:rPr lang="en-US" altLang="ko-KR" sz="2800" kern="0" dirty="0" err="1">
+                <a:solidFill>
+                  <a:prstClr val="black">
+                    <a:lumMod val="75000"/>
+                    <a:lumOff val="25000"/>
+                  </a:prstClr>
+                </a:solidFill>
+              </a:rPr>
+              <a:t>DB_table</a:t>
+            </a:r>
+            <a:endParaRPr lang="ko-KR" altLang="en-US" sz="2800" kern="0">
+              <a:solidFill>
+                <a:prstClr val="black">
+                  <a:lumMod val="75000"/>
+                  <a:lumOff val="25000"/>
+                </a:prstClr>
+              </a:solidFill>
+            </a:endParaRPr>
+          </a:p>
+          <a:p>
             <a:endParaRPr lang="ko-KR" altLang="en-US" dirty="0">
               <a:ea typeface="맑은 고딕"/>
             </a:endParaRPr>
@@ -10692,14 +10782,14 @@
           <p:nvPr>
             <p:extLst>
               <p:ext uri="{D42A27DB-BD31-4B8C-83A1-F6EECF244321}">
-                <p14:modId xmlns:p14="http://schemas.microsoft.com/office/powerpoint/2010/main" val="4216504579"/>
+                <p14:modId xmlns:p14="http://schemas.microsoft.com/office/powerpoint/2010/main" val="2808853833"/>
               </p:ext>
             </p:extLst>
           </p:nvPr>
         </p:nvGraphicFramePr>
         <p:xfrm>
-          <a:off x="9054919" y="1482073"/>
-          <a:ext cx="4040177" cy="3916330"/>
+          <a:off x="9223152" y="688024"/>
+          <a:ext cx="4970682" cy="4971018"/>
         </p:xfrm>
         <a:graphic>
           <a:graphicData uri="http://schemas.openxmlformats.org/drawingml/2006/table">
@@ -10708,14 +10798,14 @@
                 <a:tableStyleId>{5C22544A-7EE6-4342-B048-85BDC9FD1C3A}</a:tableStyleId>
               </a:tblPr>
               <a:tblGrid>
-                <a:gridCol w="1644557">
+                <a:gridCol w="2023320">
                   <a:extLst>
                     <a:ext uri="{9D8B030D-6E8A-4147-A177-3AD203B41FA5}">
                       <a16:colId xmlns:a16="http://schemas.microsoft.com/office/drawing/2014/main" val="2495929496"/>
                     </a:ext>
                   </a:extLst>
                 </a:gridCol>
-                <a:gridCol w="2395620">
+                <a:gridCol w="2947362">
                   <a:extLst>
                     <a:ext uri="{9D8B030D-6E8A-4147-A177-3AD203B41FA5}">
                       <a16:colId xmlns:a16="http://schemas.microsoft.com/office/drawing/2014/main" val="570129845"/>
@@ -10723,14 +10813,14 @@
                   </a:extLst>
                 </a:gridCol>
               </a:tblGrid>
-              <a:tr h="0">
+              <a:tr h="328852">
                 <a:tc gridSpan="2">
                   <a:txBody>
                     <a:bodyPr/>
                     <a:lstStyle/>
                     <a:p>
                       <a:pPr latinLnBrk="1"/>
-                      <a:endParaRPr lang="ko-KR" altLang="en-US" sz="1100" dirty="0"/>
+                      <a:endParaRPr lang="ko-KR" altLang="en-US" sz="1400" dirty="0"/>
                     </a:p>
                   </a:txBody>
                   <a:tcPr/>
@@ -10751,7 +10841,7 @@
                   </a:ext>
                 </a:extLst>
               </a:tr>
-              <a:tr h="752772">
+              <a:tr h="955497">
                 <a:tc>
                   <a:txBody>
                     <a:bodyPr/>
@@ -10759,10 +10849,10 @@
                     <a:p>
                       <a:pPr algn="ctr" latinLnBrk="1"/>
                       <a:r>
-                        <a:rPr lang="en-US" altLang="ko-KR" sz="1100" dirty="0" err="1"/>
+                        <a:rPr lang="en-US" altLang="ko-KR" sz="1400" dirty="0" err="1"/>
                         <a:t>todoheader</a:t>
                       </a:r>
-                      <a:endParaRPr lang="ko-KR" altLang="en-US" sz="1100" dirty="0"/>
+                      <a:endParaRPr lang="ko-KR" altLang="en-US" sz="1400" dirty="0"/>
                     </a:p>
                   </a:txBody>
                   <a:tcPr/>
@@ -10774,51 +10864,51 @@
                     <a:p>
                       <a:pPr latinLnBrk="1"/>
                       <a:r>
-                        <a:rPr lang="ko-KR" altLang="en-US" sz="1100" dirty="0"/>
+                        <a:rPr lang="ko-KR" altLang="en-US" sz="1400" dirty="0"/>
                         <a:t>년도</a:t>
                       </a:r>
                       <a:r>
-                        <a:rPr lang="en-US" altLang="ko-KR" sz="1100" dirty="0"/>
+                        <a:rPr lang="en-US" altLang="ko-KR" sz="1400" dirty="0"/>
                         <a:t>,</a:t>
                       </a:r>
                       <a:r>
-                        <a:rPr lang="ko-KR" altLang="en-US" sz="1100" dirty="0"/>
+                        <a:rPr lang="ko-KR" altLang="en-US" sz="1400" dirty="0"/>
                         <a:t>월</a:t>
                       </a:r>
                       <a:r>
-                        <a:rPr lang="en-US" altLang="ko-KR" sz="1100" dirty="0"/>
+                        <a:rPr lang="en-US" altLang="ko-KR" sz="1400" dirty="0"/>
                         <a:t>,</a:t>
                       </a:r>
                       <a:r>
-                        <a:rPr lang="ko-KR" altLang="en-US" sz="1100" dirty="0"/>
+                        <a:rPr lang="ko-KR" altLang="en-US" sz="1400" dirty="0"/>
                         <a:t>일</a:t>
                       </a:r>
                       <a:r>
-                        <a:rPr lang="en-US" altLang="ko-KR" sz="1100" dirty="0"/>
+                        <a:rPr lang="en-US" altLang="ko-KR" sz="1400" dirty="0"/>
                         <a:t>, </a:t>
                       </a:r>
                       <a:r>
-                        <a:rPr lang="ko-KR" altLang="en-US" sz="1100" dirty="0"/>
+                        <a:rPr lang="ko-KR" altLang="en-US" sz="1400" dirty="0"/>
                         <a:t>요일과 </a:t>
                       </a:r>
-                      <a:endParaRPr lang="en-US" altLang="ko-KR" sz="1100" dirty="0"/>
+                      <a:endParaRPr lang="en-US" altLang="ko-KR" sz="1400" dirty="0"/>
                     </a:p>
                     <a:p>
                       <a:pPr latinLnBrk="1"/>
                       <a:r>
-                        <a:rPr lang="ko-KR" altLang="en-US" sz="1100" dirty="0" err="1"/>
+                        <a:rPr lang="ko-KR" altLang="en-US" sz="1400" dirty="0" err="1"/>
                         <a:t>체크안한</a:t>
                       </a:r>
                       <a:r>
-                        <a:rPr lang="ko-KR" altLang="en-US" sz="1100" dirty="0"/>
+                        <a:rPr lang="ko-KR" altLang="en-US" sz="1400" dirty="0"/>
                         <a:t> </a:t>
                       </a:r>
                       <a:r>
-                        <a:rPr lang="en-US" altLang="ko-KR" sz="1100" dirty="0" err="1"/>
+                        <a:rPr lang="en-US" altLang="ko-KR" sz="1400" dirty="0" err="1"/>
                         <a:t>todoitem</a:t>
                       </a:r>
                       <a:r>
-                        <a:rPr lang="ko-KR" altLang="en-US" sz="1100" dirty="0"/>
+                        <a:rPr lang="ko-KR" altLang="en-US" sz="1400" dirty="0"/>
                         <a:t>의 개수가 나타나는 컴포넌트</a:t>
                       </a:r>
                     </a:p>
@@ -10831,7 +10921,7 @@
                   </a:ext>
                 </a:extLst>
               </a:tr>
-              <a:tr h="464716">
+              <a:tr h="589866">
                 <a:tc>
                   <a:txBody>
                     <a:bodyPr/>
@@ -10839,10 +10929,10 @@
                     <a:p>
                       <a:pPr algn="ctr" latinLnBrk="1"/>
                       <a:r>
-                        <a:rPr lang="en-US" altLang="ko-KR" sz="1100" dirty="0" err="1"/>
+                        <a:rPr lang="en-US" altLang="ko-KR" sz="1400" dirty="0" err="1"/>
                         <a:t>todoCreate</a:t>
                       </a:r>
-                      <a:endParaRPr lang="ko-KR" altLang="en-US" sz="1100" dirty="0"/>
+                      <a:endParaRPr lang="ko-KR" altLang="en-US" sz="1400" dirty="0"/>
                     </a:p>
                   </a:txBody>
                   <a:tcPr/>
@@ -10854,15 +10944,15 @@
                     <a:p>
                       <a:pPr latinLnBrk="1"/>
                       <a:r>
-                        <a:rPr lang="ko-KR" altLang="en-US" sz="1100" dirty="0"/>
+                        <a:rPr lang="ko-KR" altLang="en-US" sz="1400" dirty="0"/>
                         <a:t>새로운 </a:t>
                       </a:r>
                       <a:r>
-                        <a:rPr lang="en-US" altLang="ko-KR" sz="1100" dirty="0" err="1"/>
+                        <a:rPr lang="en-US" altLang="ko-KR" sz="1400" dirty="0" err="1"/>
                         <a:t>todoitem</a:t>
                       </a:r>
                       <a:r>
-                        <a:rPr lang="ko-KR" altLang="en-US" sz="1100" dirty="0"/>
+                        <a:rPr lang="ko-KR" altLang="en-US" sz="1400" dirty="0"/>
                         <a:t>을 등록하는 컴포넌트</a:t>
                       </a:r>
                     </a:p>
@@ -10875,7 +10965,7 @@
                   </a:ext>
                 </a:extLst>
               </a:tr>
-              <a:tr h="497910">
+              <a:tr h="632000">
                 <a:tc>
                   <a:txBody>
                     <a:bodyPr/>
@@ -10885,10 +10975,10 @@
                         <a:buNone/>
                       </a:pPr>
                       <a:r>
-                        <a:rPr lang="en-US" altLang="ko-KR" sz="1100" dirty="0" err="1"/>
+                        <a:rPr lang="en-US" altLang="ko-KR" sz="1400" dirty="0" err="1"/>
                         <a:t>todoList</a:t>
                       </a:r>
-                      <a:endParaRPr lang="ko-KR" altLang="en-US" sz="1100" dirty="0"/>
+                      <a:endParaRPr lang="ko-KR" altLang="en-US" sz="1400" dirty="0"/>
                     </a:p>
                   </a:txBody>
                   <a:tcPr/>
@@ -10902,38 +10992,38 @@
                         <a:buNone/>
                       </a:pPr>
                       <a:r>
-                        <a:rPr lang="ko-KR" altLang="en-US" sz="1200" dirty="0"/>
+                        <a:rPr lang="ko-KR" altLang="en-US" sz="1600" dirty="0"/>
                         <a:t>작성된 </a:t>
                       </a:r>
                       <a:r>
-                        <a:rPr lang="en-US" altLang="ko-KR" sz="1200" dirty="0" err="1"/>
+                        <a:rPr lang="en-US" altLang="ko-KR" sz="1600" dirty="0" err="1"/>
                         <a:t>todoItem</a:t>
                       </a:r>
                       <a:r>
-                        <a:rPr lang="ko-KR" altLang="en-US" sz="1200" dirty="0"/>
+                        <a:rPr lang="ko-KR" altLang="en-US" sz="1600" dirty="0"/>
                         <a:t>이 담겨지는 </a:t>
                       </a:r>
                       <a:r>
-                        <a:rPr lang="en-US" altLang="ko-KR" sz="1200" dirty="0" err="1"/>
+                        <a:rPr lang="en-US" altLang="ko-KR" sz="1600" dirty="0" err="1"/>
                         <a:t>todolist</a:t>
                       </a:r>
                       <a:r>
-                        <a:rPr lang="en-US" altLang="ko-KR" sz="1200" dirty="0"/>
+                        <a:rPr lang="en-US" altLang="ko-KR" sz="1600" dirty="0"/>
                         <a:t> &lt;</a:t>
                       </a:r>
                       <a:r>
-                        <a:rPr lang="en-US" altLang="ko-KR" sz="1200" dirty="0" err="1"/>
+                        <a:rPr lang="en-US" altLang="ko-KR" sz="1600" dirty="0" err="1"/>
                         <a:t>ul</a:t>
                       </a:r>
                       <a:r>
-                        <a:rPr lang="en-US" altLang="ko-KR" sz="1200" dirty="0"/>
+                        <a:rPr lang="en-US" altLang="ko-KR" sz="1600" dirty="0"/>
                         <a:t>&gt; </a:t>
                       </a:r>
                       <a:r>
-                        <a:rPr lang="ko-KR" altLang="en-US" sz="1200" dirty="0"/>
+                        <a:rPr lang="ko-KR" altLang="en-US" sz="1600" dirty="0"/>
                         <a:t>컴포넌트</a:t>
                       </a:r>
-                      <a:endParaRPr lang="ko-KR" sz="1200" dirty="0"/>
+                      <a:endParaRPr lang="ko-KR" sz="1600" dirty="0"/>
                     </a:p>
                   </a:txBody>
                   <a:tcPr/>
@@ -10944,7 +11034,7 @@
                   </a:ext>
                 </a:extLst>
               </a:tr>
-              <a:tr h="647284">
+              <a:tr h="821601">
                 <a:tc>
                   <a:txBody>
                     <a:bodyPr/>
@@ -10954,10 +11044,10 @@
                         <a:buNone/>
                       </a:pPr>
                       <a:r>
-                        <a:rPr lang="en-US" altLang="ko-KR" sz="1100" dirty="0" err="1"/>
+                        <a:rPr lang="en-US" altLang="ko-KR" sz="1400" dirty="0" err="1"/>
                         <a:t>todoItem</a:t>
                       </a:r>
-                      <a:endParaRPr lang="ko-KR" altLang="en-US" sz="1100" dirty="0"/>
+                      <a:endParaRPr lang="ko-KR" altLang="en-US" sz="1400" dirty="0"/>
                     </a:p>
                   </a:txBody>
                   <a:tcPr/>
@@ -10971,39 +11061,39 @@
                         <a:buNone/>
                       </a:pPr>
                       <a:r>
-                        <a:rPr lang="ko-KR" altLang="en-US" sz="1100" dirty="0"/>
+                        <a:rPr lang="ko-KR" altLang="en-US" sz="1400" dirty="0"/>
                         <a:t>수정</a:t>
                       </a:r>
                       <a:r>
-                        <a:rPr lang="en-US" altLang="ko-KR" sz="1100" dirty="0"/>
+                        <a:rPr lang="en-US" altLang="ko-KR" sz="1400" dirty="0"/>
                         <a:t>,</a:t>
                       </a:r>
                       <a:r>
-                        <a:rPr lang="ko-KR" altLang="en-US" sz="1100" dirty="0"/>
+                        <a:rPr lang="ko-KR" altLang="en-US" sz="1400" dirty="0"/>
                         <a:t>삭제 </a:t>
                       </a:r>
                       <a:r>
-                        <a:rPr lang="en-US" altLang="ko-KR" sz="1100" dirty="0"/>
+                        <a:rPr lang="en-US" altLang="ko-KR" sz="1400" dirty="0"/>
                         <a:t>, </a:t>
                       </a:r>
                       <a:r>
-                        <a:rPr lang="ko-KR" altLang="en-US" sz="1100" dirty="0"/>
+                        <a:rPr lang="ko-KR" altLang="en-US" sz="1400" dirty="0"/>
                         <a:t>완료한목록 체크 기능을 포함한 추가된 </a:t>
                       </a:r>
                       <a:r>
-                        <a:rPr lang="en-US" altLang="ko-KR" sz="1100" dirty="0" err="1"/>
+                        <a:rPr lang="en-US" altLang="ko-KR" sz="1400" dirty="0" err="1"/>
                         <a:t>todo</a:t>
                       </a:r>
                       <a:r>
-                        <a:rPr lang="ko-KR" altLang="en-US" sz="1100" dirty="0"/>
+                        <a:rPr lang="ko-KR" altLang="en-US" sz="1400" dirty="0"/>
                         <a:t> </a:t>
                       </a:r>
                       <a:r>
-                        <a:rPr lang="en-US" altLang="ko-KR" sz="1100" dirty="0"/>
+                        <a:rPr lang="en-US" altLang="ko-KR" sz="1400" dirty="0"/>
                         <a:t>&lt;li&gt;</a:t>
                       </a:r>
                       <a:r>
-                        <a:rPr lang="ko-KR" altLang="en-US" sz="1100" dirty="0"/>
+                        <a:rPr lang="ko-KR" altLang="en-US" sz="1400" dirty="0"/>
                         <a:t> 컴포넌트</a:t>
                       </a:r>
                     </a:p>
@@ -11016,7 +11106,7 @@
                   </a:ext>
                 </a:extLst>
               </a:tr>
-              <a:tr h="647284">
+              <a:tr h="821601">
                 <a:tc>
                   <a:txBody>
                     <a:bodyPr/>
@@ -11026,10 +11116,10 @@
                         <a:buNone/>
                       </a:pPr>
                       <a:r>
-                        <a:rPr lang="en-US" altLang="ko-KR" sz="1100" dirty="0" err="1"/>
+                        <a:rPr lang="en-US" altLang="ko-KR" sz="1400" dirty="0" err="1"/>
                         <a:t>todoTemplate</a:t>
                       </a:r>
-                      <a:endParaRPr lang="ko-KR" altLang="en-US" sz="1100" dirty="0"/>
+                      <a:endParaRPr lang="ko-KR" altLang="en-US" sz="1400" dirty="0"/>
                     </a:p>
                   </a:txBody>
                   <a:tcPr/>
@@ -11043,22 +11133,22 @@
                         <a:buNone/>
                       </a:pPr>
                       <a:r>
-                        <a:rPr lang="en-US" altLang="ko-KR" sz="1100" dirty="0" err="1"/>
+                        <a:rPr lang="en-US" altLang="ko-KR" sz="1400" dirty="0" err="1"/>
                         <a:t>Todo</a:t>
                       </a:r>
                       <a:r>
-                        <a:rPr lang="en-US" altLang="ko-KR" sz="1100" dirty="0"/>
+                        <a:rPr lang="en-US" altLang="ko-KR" sz="1400" dirty="0"/>
                         <a:t> app</a:t>
                       </a:r>
                       <a:r>
-                        <a:rPr lang="ko-KR" altLang="en-US" sz="1100" dirty="0"/>
+                        <a:rPr lang="ko-KR" altLang="en-US" sz="1400" dirty="0"/>
                         <a:t>을 이루는 기능 컴포넌트를 포함하고 있는 가장 큰 베이스 </a:t>
                       </a:r>
                       <a:r>
-                        <a:rPr lang="ko-KR" altLang="en-US" sz="1100" dirty="0" err="1"/>
+                        <a:rPr lang="ko-KR" altLang="en-US" sz="1400" dirty="0" err="1"/>
                         <a:t>부모컴포넌트</a:t>
                       </a:r>
-                      <a:endParaRPr lang="ko-KR" altLang="en-US" sz="1100" dirty="0"/>
+                      <a:endParaRPr lang="ko-KR" altLang="en-US" sz="1400" dirty="0"/>
                     </a:p>
                   </a:txBody>
                   <a:tcPr/>
@@ -11069,7 +11159,7 @@
                   </a:ext>
                 </a:extLst>
               </a:tr>
-              <a:tr h="647284">
+              <a:tr h="821601">
                 <a:tc>
                   <a:txBody>
                     <a:bodyPr/>
@@ -11078,7 +11168,7 @@
                       <a:pPr lvl="0" algn="ctr">
                         <a:buNone/>
                       </a:pPr>
-                      <a:endParaRPr lang="ko-KR" altLang="en-US" sz="1100" dirty="0"/>
+                      <a:endParaRPr lang="ko-KR" altLang="en-US" sz="1400" dirty="0"/>
                     </a:p>
                   </a:txBody>
                   <a:tcPr/>
@@ -11091,7 +11181,7 @@
                       <a:pPr lvl="0">
                         <a:buNone/>
                       </a:pPr>
-                      <a:endParaRPr lang="ko-KR" altLang="en-US" sz="1100" dirty="0"/>
+                      <a:endParaRPr lang="ko-KR" altLang="en-US" sz="1400" dirty="0"/>
                     </a:p>
                   </a:txBody>
                   <a:tcPr/>
@@ -11120,10 +11210,10 @@
         </p:nvGrpSpPr>
         <p:grpSpPr>
           <a:xfrm>
-            <a:off x="252958" y="215442"/>
-            <a:ext cx="8509360" cy="6427116"/>
-            <a:chOff x="295275" y="190500"/>
-            <a:chExt cx="11601450" cy="6477000"/>
+            <a:off x="238768" y="215442"/>
+            <a:ext cx="8523550" cy="6427117"/>
+            <a:chOff x="275929" y="190500"/>
+            <a:chExt cx="11620796" cy="6477000"/>
           </a:xfrm>
         </p:grpSpPr>
         <p:sp>
@@ -11211,7 +11301,7 @@
           </p:nvSpPr>
           <p:spPr>
             <a:xfrm>
-              <a:off x="295275" y="190500"/>
+              <a:off x="275929" y="258730"/>
               <a:ext cx="11601450" cy="476250"/>
             </a:xfrm>
             <a:prstGeom prst="round2SameRect">
@@ -11253,6 +11343,17 @@
                 <a:defRPr/>
               </a:pPr>
               <a:r>
+                <a:rPr lang="en-US" altLang="ko-KR" sz="2400" kern="0" dirty="0">
+                  <a:solidFill>
+                    <a:prstClr val="black">
+                      <a:lumMod val="75000"/>
+                      <a:lumOff val="25000"/>
+                    </a:prstClr>
+                  </a:solidFill>
+                </a:rPr>
+                <a:t>6. YJ-</a:t>
+              </a:r>
+              <a:r>
                 <a:rPr lang="en-US" altLang="ko-KR" sz="2400" kern="0" dirty="0" err="1">
                   <a:solidFill>
                     <a:prstClr val="black">
@@ -11261,7 +11362,7 @@
                     </a:prstClr>
                   </a:solidFill>
                 </a:rPr>
-                <a:t>TodoPage</a:t>
+                <a:t>ToDoPage</a:t>
               </a:r>
               <a:endParaRPr lang="ko-KR" altLang="en-US" sz="2400" kern="0" dirty="0">
                 <a:solidFill>
@@ -11625,7 +11726,7 @@
         </p:nvSpPr>
         <p:spPr>
           <a:xfrm>
-            <a:off x="2345762" y="2499790"/>
+            <a:off x="2345762" y="2472683"/>
             <a:ext cx="4295372" cy="3487552"/>
           </a:xfrm>
           <a:prstGeom prst="rect">
@@ -11669,8 +11770,8 @@
         </p:nvSpPr>
         <p:spPr>
           <a:xfrm>
-            <a:off x="3109998" y="3098241"/>
-            <a:ext cx="2425590" cy="461638"/>
+            <a:off x="3078896" y="3102220"/>
+            <a:ext cx="2841137" cy="461638"/>
           </a:xfrm>
           <a:prstGeom prst="rect">
             <a:avLst/>
@@ -11725,8 +11826,8 @@
         </p:nvSpPr>
         <p:spPr>
           <a:xfrm>
-            <a:off x="5617403" y="3132568"/>
-            <a:ext cx="668231" cy="392984"/>
+            <a:off x="5223020" y="3173425"/>
+            <a:ext cx="602243" cy="355703"/>
           </a:xfrm>
           <a:prstGeom prst="rect">
             <a:avLst/>
@@ -11752,7 +11853,7 @@
           <a:p>
             <a:pPr algn="ctr"/>
             <a:r>
-              <a:rPr lang="ko-KR" altLang="en-US" dirty="0"/>
+              <a:rPr lang="ko-KR" altLang="en-US" sz="1200" dirty="0"/>
               <a:t>추가</a:t>
             </a:r>
           </a:p>
@@ -11828,8 +11929,8 @@
         </p:nvSpPr>
         <p:spPr>
           <a:xfrm>
-            <a:off x="3109998" y="3644745"/>
-            <a:ext cx="2425590" cy="2199873"/>
+            <a:off x="3109997" y="3644745"/>
+            <a:ext cx="2841137" cy="2199873"/>
           </a:xfrm>
           <a:prstGeom prst="rect">
             <a:avLst/>
@@ -12090,6 +12191,1457 @@
     <p:extLst>
       <p:ext uri="{BB962C8B-B14F-4D97-AF65-F5344CB8AC3E}">
         <p14:creationId xmlns:p14="http://schemas.microsoft.com/office/powerpoint/2010/main" val="217060492"/>
+      </p:ext>
+    </p:extLst>
+  </p:cSld>
+  <p:clrMapOvr>
+    <a:masterClrMapping/>
+  </p:clrMapOvr>
+</p:sld>
+</file>
+
+<file path=ppt/slides/slide8.xml><?xml version="1.0" encoding="utf-8"?>
+<p:sld xmlns:a="http://schemas.openxmlformats.org/drawingml/2006/main" xmlns:r="http://schemas.openxmlformats.org/officeDocument/2006/relationships" xmlns:p="http://schemas.openxmlformats.org/presentationml/2006/main">
+  <p:cSld>
+    <p:spTree>
+      <p:nvGrpSpPr>
+        <p:cNvPr id="1" name=""/>
+        <p:cNvGrpSpPr/>
+        <p:nvPr/>
+      </p:nvGrpSpPr>
+      <p:grpSpPr>
+        <a:xfrm>
+          <a:off x="0" y="0"/>
+          <a:ext cx="0" cy="0"/>
+          <a:chOff x="0" y="0"/>
+          <a:chExt cx="0" cy="0"/>
+        </a:xfrm>
+      </p:grpSpPr>
+      <p:graphicFrame>
+        <p:nvGraphicFramePr>
+          <p:cNvPr id="4" name="표 8">
+            <a:extLst>
+              <a:ext uri="{FF2B5EF4-FFF2-40B4-BE49-F238E27FC236}">
+                <a16:creationId xmlns:a16="http://schemas.microsoft.com/office/drawing/2014/main" id="{1637C2BF-E57B-C687-C260-8CF31D38E353}"/>
+              </a:ext>
+            </a:extLst>
+          </p:cNvPr>
+          <p:cNvGraphicFramePr>
+            <a:graphicFrameLocks noGrp="1"/>
+          </p:cNvGraphicFramePr>
+          <p:nvPr>
+            <p:extLst>
+              <p:ext uri="{D42A27DB-BD31-4B8C-83A1-F6EECF244321}">
+                <p14:modId xmlns:p14="http://schemas.microsoft.com/office/powerpoint/2010/main" val="190653777"/>
+              </p:ext>
+            </p:extLst>
+          </p:nvPr>
+        </p:nvGraphicFramePr>
+        <p:xfrm>
+          <a:off x="9223152" y="1068120"/>
+          <a:ext cx="4970682" cy="4946966"/>
+        </p:xfrm>
+        <a:graphic>
+          <a:graphicData uri="http://schemas.openxmlformats.org/drawingml/2006/table">
+            <a:tbl>
+              <a:tblPr firstRow="1" bandRow="1">
+                <a:tableStyleId>{5C22544A-7EE6-4342-B048-85BDC9FD1C3A}</a:tableStyleId>
+              </a:tblPr>
+              <a:tblGrid>
+                <a:gridCol w="2023320">
+                  <a:extLst>
+                    <a:ext uri="{9D8B030D-6E8A-4147-A177-3AD203B41FA5}">
+                      <a16:colId xmlns:a16="http://schemas.microsoft.com/office/drawing/2014/main" val="2495929496"/>
+                    </a:ext>
+                  </a:extLst>
+                </a:gridCol>
+                <a:gridCol w="2947362">
+                  <a:extLst>
+                    <a:ext uri="{9D8B030D-6E8A-4147-A177-3AD203B41FA5}">
+                      <a16:colId xmlns:a16="http://schemas.microsoft.com/office/drawing/2014/main" val="570129845"/>
+                    </a:ext>
+                  </a:extLst>
+                </a:gridCol>
+              </a:tblGrid>
+              <a:tr h="0">
+                <a:tc gridSpan="2">
+                  <a:txBody>
+                    <a:bodyPr/>
+                    <a:lstStyle/>
+                    <a:p>
+                      <a:pPr latinLnBrk="1"/>
+                      <a:endParaRPr lang="ko-KR" altLang="en-US" sz="1400" dirty="0"/>
+                    </a:p>
+                  </a:txBody>
+                  <a:tcPr/>
+                </a:tc>
+                <a:tc hMerge="1">
+                  <a:txBody>
+                    <a:bodyPr/>
+                    <a:lstStyle/>
+                    <a:p>
+                      <a:endParaRPr lang="ko-KR"/>
+                    </a:p>
+                  </a:txBody>
+                  <a:tcPr/>
+                </a:tc>
+                <a:extLst>
+                  <a:ext uri="{0D108BD9-81ED-4DB2-BD59-A6C34878D82A}">
+                    <a16:rowId xmlns:a16="http://schemas.microsoft.com/office/drawing/2014/main" val="2008572879"/>
+                  </a:ext>
+                </a:extLst>
+              </a:tr>
+              <a:tr h="955497">
+                <a:tc>
+                  <a:txBody>
+                    <a:bodyPr/>
+                    <a:lstStyle/>
+                    <a:p>
+                      <a:pPr algn="ctr" latinLnBrk="1"/>
+                      <a:r>
+                        <a:rPr lang="en-US" altLang="ko-KR" sz="1400" dirty="0" err="1"/>
+                        <a:t>todoheader</a:t>
+                      </a:r>
+                      <a:endParaRPr lang="ko-KR" altLang="en-US" sz="1400" dirty="0"/>
+                    </a:p>
+                  </a:txBody>
+                  <a:tcPr/>
+                </a:tc>
+                <a:tc>
+                  <a:txBody>
+                    <a:bodyPr/>
+                    <a:lstStyle/>
+                    <a:p>
+                      <a:pPr latinLnBrk="1"/>
+                      <a:r>
+                        <a:rPr lang="ko-KR" altLang="en-US" sz="1400" dirty="0"/>
+                        <a:t>년도</a:t>
+                      </a:r>
+                      <a:r>
+                        <a:rPr lang="en-US" altLang="ko-KR" sz="1400" dirty="0"/>
+                        <a:t>,</a:t>
+                      </a:r>
+                      <a:r>
+                        <a:rPr lang="ko-KR" altLang="en-US" sz="1400" dirty="0"/>
+                        <a:t>월</a:t>
+                      </a:r>
+                      <a:r>
+                        <a:rPr lang="en-US" altLang="ko-KR" sz="1400" dirty="0"/>
+                        <a:t>,</a:t>
+                      </a:r>
+                      <a:r>
+                        <a:rPr lang="ko-KR" altLang="en-US" sz="1400" dirty="0"/>
+                        <a:t>일</a:t>
+                      </a:r>
+                      <a:r>
+                        <a:rPr lang="en-US" altLang="ko-KR" sz="1400" dirty="0"/>
+                        <a:t>, </a:t>
+                      </a:r>
+                      <a:r>
+                        <a:rPr lang="ko-KR" altLang="en-US" sz="1400" dirty="0"/>
+                        <a:t>요일과 </a:t>
+                      </a:r>
+                      <a:endParaRPr lang="en-US" altLang="ko-KR" sz="1400" dirty="0"/>
+                    </a:p>
+                    <a:p>
+                      <a:pPr latinLnBrk="1"/>
+                      <a:r>
+                        <a:rPr lang="ko-KR" altLang="en-US" sz="1400" dirty="0" err="1"/>
+                        <a:t>체크안한</a:t>
+                      </a:r>
+                      <a:r>
+                        <a:rPr lang="ko-KR" altLang="en-US" sz="1400" dirty="0"/>
+                        <a:t> </a:t>
+                      </a:r>
+                      <a:r>
+                        <a:rPr lang="en-US" altLang="ko-KR" sz="1400" dirty="0" err="1"/>
+                        <a:t>todoitem</a:t>
+                      </a:r>
+                      <a:r>
+                        <a:rPr lang="ko-KR" altLang="en-US" sz="1400" dirty="0"/>
+                        <a:t>의 개수가 나타나는 컴포넌트</a:t>
+                      </a:r>
+                    </a:p>
+                  </a:txBody>
+                  <a:tcPr/>
+                </a:tc>
+                <a:extLst>
+                  <a:ext uri="{0D108BD9-81ED-4DB2-BD59-A6C34878D82A}">
+                    <a16:rowId xmlns:a16="http://schemas.microsoft.com/office/drawing/2014/main" val="4132001072"/>
+                  </a:ext>
+                </a:extLst>
+              </a:tr>
+              <a:tr h="589866">
+                <a:tc>
+                  <a:txBody>
+                    <a:bodyPr/>
+                    <a:lstStyle/>
+                    <a:p>
+                      <a:pPr algn="ctr" latinLnBrk="1"/>
+                      <a:r>
+                        <a:rPr lang="en-US" altLang="ko-KR" sz="1400" dirty="0" err="1"/>
+                        <a:t>todoCreate</a:t>
+                      </a:r>
+                      <a:endParaRPr lang="ko-KR" altLang="en-US" sz="1400" dirty="0"/>
+                    </a:p>
+                  </a:txBody>
+                  <a:tcPr/>
+                </a:tc>
+                <a:tc>
+                  <a:txBody>
+                    <a:bodyPr/>
+                    <a:lstStyle/>
+                    <a:p>
+                      <a:pPr latinLnBrk="1"/>
+                      <a:r>
+                        <a:rPr lang="ko-KR" altLang="en-US" sz="1400" dirty="0"/>
+                        <a:t>새로운 </a:t>
+                      </a:r>
+                      <a:r>
+                        <a:rPr lang="en-US" altLang="ko-KR" sz="1400" dirty="0" err="1"/>
+                        <a:t>todoitem</a:t>
+                      </a:r>
+                      <a:r>
+                        <a:rPr lang="ko-KR" altLang="en-US" sz="1400" dirty="0"/>
+                        <a:t>을 등록하는 컴포넌트</a:t>
+                      </a:r>
+                    </a:p>
+                  </a:txBody>
+                  <a:tcPr/>
+                </a:tc>
+                <a:extLst>
+                  <a:ext uri="{0D108BD9-81ED-4DB2-BD59-A6C34878D82A}">
+                    <a16:rowId xmlns:a16="http://schemas.microsoft.com/office/drawing/2014/main" val="1694563361"/>
+                  </a:ext>
+                </a:extLst>
+              </a:tr>
+              <a:tr h="632000">
+                <a:tc>
+                  <a:txBody>
+                    <a:bodyPr/>
+                    <a:lstStyle/>
+                    <a:p>
+                      <a:pPr lvl="0" algn="ctr">
+                        <a:buNone/>
+                      </a:pPr>
+                      <a:r>
+                        <a:rPr lang="en-US" altLang="ko-KR" sz="1400" dirty="0" err="1"/>
+                        <a:t>todoList</a:t>
+                      </a:r>
+                      <a:endParaRPr lang="ko-KR" altLang="en-US" sz="1400" dirty="0"/>
+                    </a:p>
+                  </a:txBody>
+                  <a:tcPr/>
+                </a:tc>
+                <a:tc>
+                  <a:txBody>
+                    <a:bodyPr/>
+                    <a:lstStyle/>
+                    <a:p>
+                      <a:pPr lvl="0">
+                        <a:buNone/>
+                      </a:pPr>
+                      <a:r>
+                        <a:rPr lang="ko-KR" altLang="en-US" sz="1600" dirty="0"/>
+                        <a:t>작성된 </a:t>
+                      </a:r>
+                      <a:r>
+                        <a:rPr lang="en-US" altLang="ko-KR" sz="1600" dirty="0" err="1"/>
+                        <a:t>todoItem</a:t>
+                      </a:r>
+                      <a:r>
+                        <a:rPr lang="ko-KR" altLang="en-US" sz="1600" dirty="0"/>
+                        <a:t>이 담겨지는 </a:t>
+                      </a:r>
+                      <a:r>
+                        <a:rPr lang="en-US" altLang="ko-KR" sz="1600" dirty="0" err="1"/>
+                        <a:t>todolist</a:t>
+                      </a:r>
+                      <a:r>
+                        <a:rPr lang="en-US" altLang="ko-KR" sz="1600" dirty="0"/>
+                        <a:t> &lt;</a:t>
+                      </a:r>
+                      <a:r>
+                        <a:rPr lang="en-US" altLang="ko-KR" sz="1600" dirty="0" err="1"/>
+                        <a:t>ul</a:t>
+                      </a:r>
+                      <a:r>
+                        <a:rPr lang="en-US" altLang="ko-KR" sz="1600" dirty="0"/>
+                        <a:t>&gt; </a:t>
+                      </a:r>
+                      <a:r>
+                        <a:rPr lang="ko-KR" altLang="en-US" sz="1600" dirty="0"/>
+                        <a:t>컴포넌트</a:t>
+                      </a:r>
+                      <a:endParaRPr lang="ko-KR" sz="1600" dirty="0"/>
+                    </a:p>
+                  </a:txBody>
+                  <a:tcPr/>
+                </a:tc>
+                <a:extLst>
+                  <a:ext uri="{0D108BD9-81ED-4DB2-BD59-A6C34878D82A}">
+                    <a16:rowId xmlns:a16="http://schemas.microsoft.com/office/drawing/2014/main" val="115353870"/>
+                  </a:ext>
+                </a:extLst>
+              </a:tr>
+              <a:tr h="821601">
+                <a:tc>
+                  <a:txBody>
+                    <a:bodyPr/>
+                    <a:lstStyle/>
+                    <a:p>
+                      <a:pPr lvl="0" algn="ctr">
+                        <a:buNone/>
+                      </a:pPr>
+                      <a:r>
+                        <a:rPr lang="en-US" altLang="ko-KR" sz="1400" dirty="0" err="1"/>
+                        <a:t>todoItem</a:t>
+                      </a:r>
+                      <a:endParaRPr lang="ko-KR" altLang="en-US" sz="1400" dirty="0"/>
+                    </a:p>
+                  </a:txBody>
+                  <a:tcPr/>
+                </a:tc>
+                <a:tc>
+                  <a:txBody>
+                    <a:bodyPr/>
+                    <a:lstStyle/>
+                    <a:p>
+                      <a:pPr lvl="0">
+                        <a:buNone/>
+                      </a:pPr>
+                      <a:r>
+                        <a:rPr lang="ko-KR" altLang="en-US" sz="1400" dirty="0"/>
+                        <a:t>수정</a:t>
+                      </a:r>
+                      <a:r>
+                        <a:rPr lang="en-US" altLang="ko-KR" sz="1400" dirty="0"/>
+                        <a:t>,</a:t>
+                      </a:r>
+                      <a:r>
+                        <a:rPr lang="ko-KR" altLang="en-US" sz="1400" dirty="0"/>
+                        <a:t>삭제 </a:t>
+                      </a:r>
+                      <a:r>
+                        <a:rPr lang="en-US" altLang="ko-KR" sz="1400" dirty="0"/>
+                        <a:t>, </a:t>
+                      </a:r>
+                      <a:r>
+                        <a:rPr lang="ko-KR" altLang="en-US" sz="1400" dirty="0"/>
+                        <a:t>완료한목록 체크 기능을 포함한 추가된 </a:t>
+                      </a:r>
+                      <a:r>
+                        <a:rPr lang="en-US" altLang="ko-KR" sz="1400" dirty="0" err="1"/>
+                        <a:t>todo</a:t>
+                      </a:r>
+                      <a:r>
+                        <a:rPr lang="ko-KR" altLang="en-US" sz="1400" dirty="0"/>
+                        <a:t> </a:t>
+                      </a:r>
+                      <a:r>
+                        <a:rPr lang="en-US" altLang="ko-KR" sz="1400" dirty="0"/>
+                        <a:t>&lt;li&gt;</a:t>
+                      </a:r>
+                      <a:r>
+                        <a:rPr lang="ko-KR" altLang="en-US" sz="1400" dirty="0"/>
+                        <a:t> 컴포넌트</a:t>
+                      </a:r>
+                    </a:p>
+                  </a:txBody>
+                  <a:tcPr/>
+                </a:tc>
+                <a:extLst>
+                  <a:ext uri="{0D108BD9-81ED-4DB2-BD59-A6C34878D82A}">
+                    <a16:rowId xmlns:a16="http://schemas.microsoft.com/office/drawing/2014/main" val="2694216502"/>
+                  </a:ext>
+                </a:extLst>
+              </a:tr>
+              <a:tr h="821601">
+                <a:tc>
+                  <a:txBody>
+                    <a:bodyPr/>
+                    <a:lstStyle/>
+                    <a:p>
+                      <a:pPr lvl="0" algn="ctr">
+                        <a:buNone/>
+                      </a:pPr>
+                      <a:r>
+                        <a:rPr lang="en-US" altLang="ko-KR" sz="1400" dirty="0" err="1"/>
+                        <a:t>todoTemplate</a:t>
+                      </a:r>
+                      <a:endParaRPr lang="ko-KR" altLang="en-US" sz="1400" dirty="0"/>
+                    </a:p>
+                  </a:txBody>
+                  <a:tcPr/>
+                </a:tc>
+                <a:tc>
+                  <a:txBody>
+                    <a:bodyPr/>
+                    <a:lstStyle/>
+                    <a:p>
+                      <a:pPr lvl="0">
+                        <a:buNone/>
+                      </a:pPr>
+                      <a:r>
+                        <a:rPr lang="en-US" altLang="ko-KR" sz="1400" dirty="0" err="1"/>
+                        <a:t>Todo</a:t>
+                      </a:r>
+                      <a:r>
+                        <a:rPr lang="en-US" altLang="ko-KR" sz="1400" dirty="0"/>
+                        <a:t> app</a:t>
+                      </a:r>
+                      <a:r>
+                        <a:rPr lang="ko-KR" altLang="en-US" sz="1400" dirty="0"/>
+                        <a:t>을 이루는 기능 컴포넌트를 포함하고 있는 가장 큰 베이스 </a:t>
+                      </a:r>
+                      <a:r>
+                        <a:rPr lang="ko-KR" altLang="en-US" sz="1400" dirty="0" err="1"/>
+                        <a:t>부모컴포넌트</a:t>
+                      </a:r>
+                      <a:endParaRPr lang="ko-KR" altLang="en-US" sz="1400" dirty="0"/>
+                    </a:p>
+                  </a:txBody>
+                  <a:tcPr/>
+                </a:tc>
+                <a:extLst>
+                  <a:ext uri="{0D108BD9-81ED-4DB2-BD59-A6C34878D82A}">
+                    <a16:rowId xmlns:a16="http://schemas.microsoft.com/office/drawing/2014/main" val="2415112225"/>
+                  </a:ext>
+                </a:extLst>
+              </a:tr>
+              <a:tr h="821601">
+                <a:tc>
+                  <a:txBody>
+                    <a:bodyPr/>
+                    <a:lstStyle/>
+                    <a:p>
+                      <a:pPr lvl="0" algn="ctr">
+                        <a:buNone/>
+                      </a:pPr>
+                      <a:endParaRPr lang="ko-KR" altLang="en-US" sz="1400" dirty="0"/>
+                    </a:p>
+                  </a:txBody>
+                  <a:tcPr/>
+                </a:tc>
+                <a:tc>
+                  <a:txBody>
+                    <a:bodyPr/>
+                    <a:lstStyle/>
+                    <a:p>
+                      <a:pPr lvl="0">
+                        <a:buNone/>
+                      </a:pPr>
+                      <a:endParaRPr lang="ko-KR" altLang="en-US" sz="1400" dirty="0"/>
+                    </a:p>
+                  </a:txBody>
+                  <a:tcPr/>
+                </a:tc>
+                <a:extLst>
+                  <a:ext uri="{0D108BD9-81ED-4DB2-BD59-A6C34878D82A}">
+                    <a16:rowId xmlns:a16="http://schemas.microsoft.com/office/drawing/2014/main" val="1011080467"/>
+                  </a:ext>
+                </a:extLst>
+              </a:tr>
+            </a:tbl>
+          </a:graphicData>
+        </a:graphic>
+      </p:graphicFrame>
+      <p:grpSp>
+        <p:nvGrpSpPr>
+          <p:cNvPr id="5" name="그룹 4">
+            <a:extLst>
+              <a:ext uri="{FF2B5EF4-FFF2-40B4-BE49-F238E27FC236}">
+                <a16:creationId xmlns:a16="http://schemas.microsoft.com/office/drawing/2014/main" id="{1E2874FE-DD85-D4E0-5320-5B4D8DD635F8}"/>
+              </a:ext>
+            </a:extLst>
+          </p:cNvPr>
+          <p:cNvGrpSpPr/>
+          <p:nvPr/>
+        </p:nvGrpSpPr>
+        <p:grpSpPr>
+          <a:xfrm>
+            <a:off x="238768" y="215442"/>
+            <a:ext cx="8523550" cy="6427117"/>
+            <a:chOff x="275929" y="190500"/>
+            <a:chExt cx="11620796" cy="6477000"/>
+          </a:xfrm>
+        </p:grpSpPr>
+        <p:sp>
+          <p:nvSpPr>
+            <p:cNvPr id="6" name="사각형: 둥근 위쪽 모서리 5">
+              <a:extLst>
+                <a:ext uri="{FF2B5EF4-FFF2-40B4-BE49-F238E27FC236}">
+                  <a16:creationId xmlns:a16="http://schemas.microsoft.com/office/drawing/2014/main" id="{4DF8CEE7-2055-834A-A45D-212A30569FAA}"/>
+                </a:ext>
+              </a:extLst>
+            </p:cNvPr>
+            <p:cNvSpPr/>
+            <p:nvPr/>
+          </p:nvSpPr>
+          <p:spPr>
+            <a:xfrm>
+              <a:off x="295275" y="190500"/>
+              <a:ext cx="11601450" cy="6477000"/>
+            </a:xfrm>
+            <a:prstGeom prst="round2SameRect">
+              <a:avLst>
+                <a:gd name="adj1" fmla="val 1526"/>
+                <a:gd name="adj2" fmla="val 1833"/>
+              </a:avLst>
+            </a:prstGeom>
+            <a:solidFill>
+              <a:srgbClr val="F0EBE7"/>
+            </a:solidFill>
+            <a:ln w="19050">
+              <a:solidFill>
+                <a:schemeClr val="tx1">
+                  <a:lumMod val="75000"/>
+                  <a:lumOff val="25000"/>
+                </a:schemeClr>
+              </a:solidFill>
+            </a:ln>
+            <a:effectLst>
+              <a:outerShdw dist="63500" dir="8100000" algn="tr" rotWithShape="0">
+                <a:prstClr val="black">
+                  <a:alpha val="25000"/>
+                </a:prstClr>
+              </a:outerShdw>
+            </a:effectLst>
+          </p:spPr>
+          <p:style>
+            <a:lnRef idx="2">
+              <a:schemeClr val="accent1">
+                <a:shade val="50000"/>
+              </a:schemeClr>
+            </a:lnRef>
+            <a:fillRef idx="1">
+              <a:schemeClr val="accent1"/>
+            </a:fillRef>
+            <a:effectRef idx="0">
+              <a:schemeClr val="accent1"/>
+            </a:effectRef>
+            <a:fontRef idx="minor">
+              <a:schemeClr val="lt1"/>
+            </a:fontRef>
+          </p:style>
+          <p:txBody>
+            <a:bodyPr rtlCol="0" anchor="ctr"/>
+            <a:lstStyle/>
+            <a:p>
+              <a:pPr algn="ctr"/>
+              <a:endParaRPr lang="ko-KR" altLang="en-US" dirty="0">
+                <a:solidFill>
+                  <a:prstClr val="white"/>
+                </a:solidFill>
+              </a:endParaRPr>
+            </a:p>
+          </p:txBody>
+        </p:sp>
+        <p:sp>
+          <p:nvSpPr>
+            <p:cNvPr id="7" name="사각형: 둥근 위쪽 모서리 6">
+              <a:extLst>
+                <a:ext uri="{FF2B5EF4-FFF2-40B4-BE49-F238E27FC236}">
+                  <a16:creationId xmlns:a16="http://schemas.microsoft.com/office/drawing/2014/main" id="{5CAF98C9-B82D-CE0D-1AD8-E0B4E46BA7F8}"/>
+                </a:ext>
+              </a:extLst>
+            </p:cNvPr>
+            <p:cNvSpPr/>
+            <p:nvPr/>
+          </p:nvSpPr>
+          <p:spPr>
+            <a:xfrm>
+              <a:off x="275929" y="258730"/>
+              <a:ext cx="11601450" cy="476250"/>
+            </a:xfrm>
+            <a:prstGeom prst="round2SameRect">
+              <a:avLst/>
+            </a:prstGeom>
+            <a:solidFill>
+              <a:schemeClr val="bg1"/>
+            </a:solidFill>
+            <a:ln w="19050">
+              <a:solidFill>
+                <a:schemeClr val="tx1">
+                  <a:lumMod val="75000"/>
+                  <a:lumOff val="25000"/>
+                </a:schemeClr>
+              </a:solidFill>
+            </a:ln>
+          </p:spPr>
+          <p:style>
+            <a:lnRef idx="2">
+              <a:schemeClr val="accent1">
+                <a:shade val="50000"/>
+              </a:schemeClr>
+            </a:lnRef>
+            <a:fillRef idx="1">
+              <a:schemeClr val="accent1"/>
+            </a:fillRef>
+            <a:effectRef idx="0">
+              <a:schemeClr val="accent1"/>
+            </a:effectRef>
+            <a:fontRef idx="minor">
+              <a:schemeClr val="lt1"/>
+            </a:fontRef>
+          </p:style>
+          <p:txBody>
+            <a:bodyPr rtlCol="0" anchor="ctr"/>
+            <a:lstStyle/>
+            <a:p>
+              <a:pPr lvl="2" latinLnBrk="0">
+                <a:defRPr/>
+              </a:pPr>
+              <a:r>
+                <a:rPr lang="en-US" altLang="ko-KR" sz="2400" kern="0" dirty="0">
+                  <a:solidFill>
+                    <a:prstClr val="black">
+                      <a:lumMod val="75000"/>
+                      <a:lumOff val="25000"/>
+                    </a:prstClr>
+                  </a:solidFill>
+                </a:rPr>
+                <a:t>7. YJ-</a:t>
+              </a:r>
+              <a:r>
+                <a:rPr lang="en-US" altLang="ko-KR" sz="2400" kern="0" dirty="0" err="1">
+                  <a:solidFill>
+                    <a:prstClr val="black">
+                      <a:lumMod val="75000"/>
+                      <a:lumOff val="25000"/>
+                    </a:prstClr>
+                  </a:solidFill>
+                </a:rPr>
+                <a:t>ToDoPage</a:t>
+              </a:r>
+              <a:r>
+                <a:rPr lang="en-US" altLang="ko-KR" sz="2400" kern="0" dirty="0">
+                  <a:solidFill>
+                    <a:prstClr val="black">
+                      <a:lumMod val="75000"/>
+                      <a:lumOff val="25000"/>
+                    </a:prstClr>
+                  </a:solidFill>
+                </a:rPr>
+                <a:t> </a:t>
+              </a:r>
+              <a:r>
+                <a:rPr lang="en-US" altLang="ko-KR" sz="2400" kern="0" dirty="0" err="1">
+                  <a:solidFill>
+                    <a:prstClr val="black">
+                      <a:lumMod val="75000"/>
+                      <a:lumOff val="25000"/>
+                    </a:prstClr>
+                  </a:solidFill>
+                </a:rPr>
+                <a:t>DB_table</a:t>
+              </a:r>
+              <a:endParaRPr lang="ko-KR" altLang="en-US" sz="2400" kern="0" dirty="0">
+                <a:solidFill>
+                  <a:prstClr val="black">
+                    <a:lumMod val="75000"/>
+                    <a:lumOff val="25000"/>
+                  </a:prstClr>
+                </a:solidFill>
+              </a:endParaRPr>
+            </a:p>
+          </p:txBody>
+        </p:sp>
+        <p:sp>
+          <p:nvSpPr>
+            <p:cNvPr id="9" name="직사각형 8">
+              <a:extLst>
+                <a:ext uri="{FF2B5EF4-FFF2-40B4-BE49-F238E27FC236}">
+                  <a16:creationId xmlns:a16="http://schemas.microsoft.com/office/drawing/2014/main" id="{455E66F7-5A9D-906C-00CD-82199466A389}"/>
+                </a:ext>
+              </a:extLst>
+            </p:cNvPr>
+            <p:cNvSpPr/>
+            <p:nvPr/>
+          </p:nvSpPr>
+          <p:spPr>
+            <a:xfrm>
+              <a:off x="609600" y="898358"/>
+              <a:ext cx="10828421" cy="818147"/>
+            </a:xfrm>
+            <a:prstGeom prst="rect">
+              <a:avLst/>
+            </a:prstGeom>
+          </p:spPr>
+          <p:style>
+            <a:lnRef idx="2">
+              <a:schemeClr val="accent6"/>
+            </a:lnRef>
+            <a:fillRef idx="1">
+              <a:schemeClr val="lt1"/>
+            </a:fillRef>
+            <a:effectRef idx="0">
+              <a:schemeClr val="accent6"/>
+            </a:effectRef>
+            <a:fontRef idx="minor">
+              <a:schemeClr val="dk1"/>
+            </a:fontRef>
+          </p:style>
+          <p:txBody>
+            <a:bodyPr rtlCol="0" anchor="ctr"/>
+            <a:lstStyle/>
+            <a:p>
+              <a:pPr algn="ctr"/>
+              <a:endParaRPr lang="ko-KR" altLang="en-US" dirty="0"/>
+            </a:p>
+          </p:txBody>
+        </p:sp>
+        <p:sp>
+          <p:nvSpPr>
+            <p:cNvPr id="11" name="직사각형 10">
+              <a:extLst>
+                <a:ext uri="{FF2B5EF4-FFF2-40B4-BE49-F238E27FC236}">
+                  <a16:creationId xmlns:a16="http://schemas.microsoft.com/office/drawing/2014/main" id="{1BFCE33D-1AF5-8089-9D4D-505B543D3BAE}"/>
+                </a:ext>
+              </a:extLst>
+            </p:cNvPr>
+            <p:cNvSpPr/>
+            <p:nvPr/>
+          </p:nvSpPr>
+          <p:spPr>
+            <a:xfrm>
+              <a:off x="1540041" y="1074821"/>
+              <a:ext cx="1608511" cy="546589"/>
+            </a:xfrm>
+            <a:prstGeom prst="rect">
+              <a:avLst/>
+            </a:prstGeom>
+          </p:spPr>
+          <p:style>
+            <a:lnRef idx="2">
+              <a:schemeClr val="accent6"/>
+            </a:lnRef>
+            <a:fillRef idx="1">
+              <a:schemeClr val="lt1"/>
+            </a:fillRef>
+            <a:effectRef idx="0">
+              <a:schemeClr val="accent6"/>
+            </a:effectRef>
+            <a:fontRef idx="minor">
+              <a:schemeClr val="dk1"/>
+            </a:fontRef>
+          </p:style>
+          <p:txBody>
+            <a:bodyPr rtlCol="0" anchor="ctr"/>
+            <a:lstStyle/>
+            <a:p>
+              <a:pPr algn="ctr"/>
+              <a:r>
+                <a:rPr lang="en-US" altLang="ko-KR" dirty="0"/>
+                <a:t>YJHJ</a:t>
+              </a:r>
+              <a:endParaRPr lang="ko-KR" altLang="en-US" dirty="0"/>
+            </a:p>
+          </p:txBody>
+        </p:sp>
+        <p:sp>
+          <p:nvSpPr>
+            <p:cNvPr id="12" name="직사각형 11">
+              <a:extLst>
+                <a:ext uri="{FF2B5EF4-FFF2-40B4-BE49-F238E27FC236}">
+                  <a16:creationId xmlns:a16="http://schemas.microsoft.com/office/drawing/2014/main" id="{38D99A5F-06C1-4C66-F7CD-430846FD828C}"/>
+                </a:ext>
+              </a:extLst>
+            </p:cNvPr>
+            <p:cNvSpPr/>
+            <p:nvPr/>
+          </p:nvSpPr>
+          <p:spPr>
+            <a:xfrm>
+              <a:off x="4908717" y="1115504"/>
+              <a:ext cx="3306989" cy="465221"/>
+            </a:xfrm>
+            <a:prstGeom prst="rect">
+              <a:avLst/>
+            </a:prstGeom>
+          </p:spPr>
+          <p:style>
+            <a:lnRef idx="2">
+              <a:schemeClr val="accent6"/>
+            </a:lnRef>
+            <a:fillRef idx="1">
+              <a:schemeClr val="lt1"/>
+            </a:fillRef>
+            <a:effectRef idx="0">
+              <a:schemeClr val="accent6"/>
+            </a:effectRef>
+            <a:fontRef idx="minor">
+              <a:schemeClr val="dk1"/>
+            </a:fontRef>
+          </p:style>
+          <p:txBody>
+            <a:bodyPr rtlCol="0" anchor="ctr"/>
+            <a:lstStyle/>
+            <a:p>
+              <a:pPr algn="ctr"/>
+              <a:r>
+                <a:rPr lang="en-US" altLang="ko-KR" dirty="0" err="1"/>
+                <a:t>BoardYJ</a:t>
+              </a:r>
+              <a:r>
+                <a:rPr lang="en-US" altLang="ko-KR" dirty="0"/>
+                <a:t>  </a:t>
+              </a:r>
+              <a:r>
+                <a:rPr lang="en-US" altLang="ko-KR" dirty="0" err="1"/>
+                <a:t>BoardHJ</a:t>
+              </a:r>
+              <a:r>
+                <a:rPr lang="en-US" altLang="ko-KR" dirty="0"/>
+                <a:t> </a:t>
+              </a:r>
+              <a:endParaRPr lang="ko-KR" altLang="en-US" dirty="0"/>
+            </a:p>
+          </p:txBody>
+        </p:sp>
+      </p:grpSp>
+      <p:sp>
+        <p:nvSpPr>
+          <p:cNvPr id="13" name="직사각형 12">
+            <a:extLst>
+              <a:ext uri="{FF2B5EF4-FFF2-40B4-BE49-F238E27FC236}">
+                <a16:creationId xmlns:a16="http://schemas.microsoft.com/office/drawing/2014/main" id="{B6ED12C8-9556-0875-3755-EFDC812F2D1B}"/>
+              </a:ext>
+            </a:extLst>
+          </p:cNvPr>
+          <p:cNvSpPr/>
+          <p:nvPr/>
+        </p:nvSpPr>
+        <p:spPr>
+          <a:xfrm>
+            <a:off x="6177661" y="1114698"/>
+            <a:ext cx="972521" cy="452877"/>
+          </a:xfrm>
+          <a:prstGeom prst="rect">
+            <a:avLst/>
+          </a:prstGeom>
+        </p:spPr>
+        <p:style>
+          <a:lnRef idx="2">
+            <a:schemeClr val="accent6"/>
+          </a:lnRef>
+          <a:fillRef idx="1">
+            <a:schemeClr val="lt1"/>
+          </a:fillRef>
+          <a:effectRef idx="0">
+            <a:schemeClr val="accent6"/>
+          </a:effectRef>
+          <a:fontRef idx="minor">
+            <a:schemeClr val="dk1"/>
+          </a:fontRef>
+        </p:style>
+        <p:txBody>
+          <a:bodyPr rtlCol="0" anchor="ctr"/>
+          <a:lstStyle/>
+          <a:p>
+            <a:pPr algn="ctr"/>
+            <a:r>
+              <a:rPr lang="en-US" altLang="ko-KR" dirty="0"/>
+              <a:t>signup</a:t>
+            </a:r>
+            <a:endParaRPr lang="ko-KR" altLang="en-US" dirty="0"/>
+          </a:p>
+        </p:txBody>
+      </p:sp>
+      <p:sp>
+        <p:nvSpPr>
+          <p:cNvPr id="15" name="직사각형 14">
+            <a:extLst>
+              <a:ext uri="{FF2B5EF4-FFF2-40B4-BE49-F238E27FC236}">
+                <a16:creationId xmlns:a16="http://schemas.microsoft.com/office/drawing/2014/main" id="{89145E81-1988-69D7-1E20-DBA7A8527C1F}"/>
+              </a:ext>
+            </a:extLst>
+          </p:cNvPr>
+          <p:cNvSpPr/>
+          <p:nvPr/>
+        </p:nvSpPr>
+        <p:spPr>
+          <a:xfrm>
+            <a:off x="7258038" y="1147322"/>
+            <a:ext cx="881012" cy="378868"/>
+          </a:xfrm>
+          <a:prstGeom prst="rect">
+            <a:avLst/>
+          </a:prstGeom>
+        </p:spPr>
+        <p:style>
+          <a:lnRef idx="2">
+            <a:schemeClr val="accent6"/>
+          </a:lnRef>
+          <a:fillRef idx="1">
+            <a:schemeClr val="lt1"/>
+          </a:fillRef>
+          <a:effectRef idx="0">
+            <a:schemeClr val="accent6"/>
+          </a:effectRef>
+          <a:fontRef idx="minor">
+            <a:schemeClr val="dk1"/>
+          </a:fontRef>
+        </p:style>
+        <p:txBody>
+          <a:bodyPr rtlCol="0" anchor="ctr"/>
+          <a:lstStyle/>
+          <a:p>
+            <a:pPr algn="ctr"/>
+            <a:r>
+              <a:rPr lang="en-US" altLang="ko-KR" dirty="0"/>
+              <a:t>login</a:t>
+            </a:r>
+            <a:endParaRPr lang="ko-KR" altLang="en-US" dirty="0"/>
+          </a:p>
+        </p:txBody>
+      </p:sp>
+      <p:sp>
+        <p:nvSpPr>
+          <p:cNvPr id="16" name="직사각형 15">
+            <a:extLst>
+              <a:ext uri="{FF2B5EF4-FFF2-40B4-BE49-F238E27FC236}">
+                <a16:creationId xmlns:a16="http://schemas.microsoft.com/office/drawing/2014/main" id="{83E6639F-6E59-B641-E203-F225909A3DF7}"/>
+              </a:ext>
+            </a:extLst>
+          </p:cNvPr>
+          <p:cNvSpPr/>
+          <p:nvPr/>
+        </p:nvSpPr>
+        <p:spPr>
+          <a:xfrm>
+            <a:off x="1627826" y="1926544"/>
+            <a:ext cx="5759624" cy="4353247"/>
+          </a:xfrm>
+          <a:prstGeom prst="rect">
+            <a:avLst/>
+          </a:prstGeom>
+        </p:spPr>
+        <p:style>
+          <a:lnRef idx="2">
+            <a:schemeClr val="accent6"/>
+          </a:lnRef>
+          <a:fillRef idx="1">
+            <a:schemeClr val="lt1"/>
+          </a:fillRef>
+          <a:effectRef idx="0">
+            <a:schemeClr val="accent6"/>
+          </a:effectRef>
+          <a:fontRef idx="minor">
+            <a:schemeClr val="dk1"/>
+          </a:fontRef>
+        </p:style>
+        <p:txBody>
+          <a:bodyPr rtlCol="0" anchor="ctr"/>
+          <a:lstStyle/>
+          <a:p>
+            <a:pPr algn="ctr"/>
+            <a:endParaRPr lang="ko-KR" altLang="en-US" dirty="0"/>
+          </a:p>
+        </p:txBody>
+      </p:sp>
+      <p:sp>
+        <p:nvSpPr>
+          <p:cNvPr id="25" name="직사각형 24">
+            <a:extLst>
+              <a:ext uri="{FF2B5EF4-FFF2-40B4-BE49-F238E27FC236}">
+                <a16:creationId xmlns:a16="http://schemas.microsoft.com/office/drawing/2014/main" id="{8D32089D-86C8-21D8-3E5D-AA827AEE65A6}"/>
+              </a:ext>
+            </a:extLst>
+          </p:cNvPr>
+          <p:cNvSpPr/>
+          <p:nvPr/>
+        </p:nvSpPr>
+        <p:spPr>
+          <a:xfrm>
+            <a:off x="2630803" y="1158576"/>
+            <a:ext cx="948357" cy="436384"/>
+          </a:xfrm>
+          <a:prstGeom prst="rect">
+            <a:avLst/>
+          </a:prstGeom>
+        </p:spPr>
+        <p:style>
+          <a:lnRef idx="2">
+            <a:schemeClr val="accent6"/>
+          </a:lnRef>
+          <a:fillRef idx="1">
+            <a:schemeClr val="lt1"/>
+          </a:fillRef>
+          <a:effectRef idx="0">
+            <a:schemeClr val="accent6"/>
+          </a:effectRef>
+          <a:fontRef idx="minor">
+            <a:schemeClr val="dk1"/>
+          </a:fontRef>
+        </p:style>
+        <p:txBody>
+          <a:bodyPr rtlCol="0" anchor="ctr"/>
+          <a:lstStyle/>
+          <a:p>
+            <a:pPr algn="ctr"/>
+            <a:r>
+              <a:rPr lang="en-US" altLang="ko-KR" dirty="0" err="1"/>
+              <a:t>YJToDo</a:t>
+            </a:r>
+            <a:endParaRPr lang="ko-KR" altLang="en-US" dirty="0"/>
+          </a:p>
+        </p:txBody>
+      </p:sp>
+      <p:graphicFrame>
+        <p:nvGraphicFramePr>
+          <p:cNvPr id="2" name="표 8">
+            <a:extLst>
+              <a:ext uri="{FF2B5EF4-FFF2-40B4-BE49-F238E27FC236}">
+                <a16:creationId xmlns:a16="http://schemas.microsoft.com/office/drawing/2014/main" id="{28033251-CA82-2C73-ECAF-A0A18C78FEEE}"/>
+              </a:ext>
+            </a:extLst>
+          </p:cNvPr>
+          <p:cNvGraphicFramePr>
+            <a:graphicFrameLocks noGrp="1"/>
+          </p:cNvGraphicFramePr>
+          <p:nvPr>
+            <p:extLst>
+              <p:ext uri="{D42A27DB-BD31-4B8C-83A1-F6EECF244321}">
+                <p14:modId xmlns:p14="http://schemas.microsoft.com/office/powerpoint/2010/main" val="2803532454"/>
+              </p:ext>
+            </p:extLst>
+          </p:nvPr>
+        </p:nvGraphicFramePr>
+        <p:xfrm>
+          <a:off x="1830708" y="1970422"/>
+          <a:ext cx="3278619" cy="4241744"/>
+        </p:xfrm>
+        <a:graphic>
+          <a:graphicData uri="http://schemas.openxmlformats.org/drawingml/2006/table">
+            <a:tbl>
+              <a:tblPr firstRow="1" bandRow="1">
+                <a:tableStyleId>{5C22544A-7EE6-4342-B048-85BDC9FD1C3A}</a:tableStyleId>
+              </a:tblPr>
+              <a:tblGrid>
+                <a:gridCol w="1633126">
+                  <a:extLst>
+                    <a:ext uri="{9D8B030D-6E8A-4147-A177-3AD203B41FA5}">
+                      <a16:colId xmlns:a16="http://schemas.microsoft.com/office/drawing/2014/main" val="2495929496"/>
+                    </a:ext>
+                  </a:extLst>
+                </a:gridCol>
+                <a:gridCol w="1645493">
+                  <a:extLst>
+                    <a:ext uri="{9D8B030D-6E8A-4147-A177-3AD203B41FA5}">
+                      <a16:colId xmlns:a16="http://schemas.microsoft.com/office/drawing/2014/main" val="570129845"/>
+                    </a:ext>
+                  </a:extLst>
+                </a:gridCol>
+              </a:tblGrid>
+              <a:tr h="225595">
+                <a:tc gridSpan="2">
+                  <a:txBody>
+                    <a:bodyPr/>
+                    <a:lstStyle/>
+                    <a:p>
+                      <a:pPr algn="ctr" latinLnBrk="1"/>
+                      <a:r>
+                        <a:rPr lang="en-US" altLang="ko-KR" sz="1400" dirty="0"/>
+                        <a:t>yj_Todo</a:t>
+                      </a:r>
+                      <a:endParaRPr lang="ko-KR" altLang="en-US" sz="1400" dirty="0"/>
+                    </a:p>
+                  </a:txBody>
+                  <a:tcPr/>
+                </a:tc>
+                <a:tc hMerge="1">
+                  <a:txBody>
+                    <a:bodyPr/>
+                    <a:lstStyle/>
+                    <a:p>
+                      <a:endParaRPr lang="ko-KR"/>
+                    </a:p>
+                  </a:txBody>
+                  <a:tcPr/>
+                </a:tc>
+                <a:extLst>
+                  <a:ext uri="{0D108BD9-81ED-4DB2-BD59-A6C34878D82A}">
+                    <a16:rowId xmlns:a16="http://schemas.microsoft.com/office/drawing/2014/main" val="2008572879"/>
+                  </a:ext>
+                </a:extLst>
+              </a:tr>
+              <a:tr h="383512">
+                <a:tc>
+                  <a:txBody>
+                    <a:bodyPr/>
+                    <a:lstStyle/>
+                    <a:p>
+                      <a:pPr algn="ctr" latinLnBrk="1"/>
+                      <a:r>
+                        <a:rPr lang="en-US" altLang="ko-KR" sz="1400" dirty="0"/>
+                        <a:t>Id</a:t>
+                      </a:r>
+                      <a:endParaRPr lang="ko-KR" altLang="en-US" sz="1400" dirty="0"/>
+                    </a:p>
+                  </a:txBody>
+                  <a:tcPr/>
+                </a:tc>
+                <a:tc>
+                  <a:txBody>
+                    <a:bodyPr/>
+                    <a:lstStyle/>
+                    <a:p>
+                      <a:pPr latinLnBrk="1"/>
+                      <a:r>
+                        <a:rPr lang="en-US" altLang="ko-KR" sz="1400" dirty="0"/>
+                        <a:t>Int </a:t>
+                      </a:r>
+                    </a:p>
+                    <a:p>
+                      <a:pPr latinLnBrk="1"/>
+                      <a:r>
+                        <a:rPr lang="en-US" altLang="ko-KR" sz="1400" dirty="0" err="1"/>
+                        <a:t>Notnull</a:t>
+                      </a:r>
+                      <a:endParaRPr lang="ko-KR" altLang="en-US" sz="1400" dirty="0"/>
+                    </a:p>
+                  </a:txBody>
+                  <a:tcPr/>
+                </a:tc>
+                <a:extLst>
+                  <a:ext uri="{0D108BD9-81ED-4DB2-BD59-A6C34878D82A}">
+                    <a16:rowId xmlns:a16="http://schemas.microsoft.com/office/drawing/2014/main" val="4132001072"/>
+                  </a:ext>
+                </a:extLst>
+              </a:tr>
+              <a:tr h="428631">
+                <a:tc>
+                  <a:txBody>
+                    <a:bodyPr/>
+                    <a:lstStyle/>
+                    <a:p>
+                      <a:pPr lvl="0" algn="ctr">
+                        <a:buNone/>
+                      </a:pPr>
+                      <a:r>
+                        <a:rPr lang="en-US" altLang="ko-KR" sz="1400" dirty="0" err="1"/>
+                        <a:t>todoContent</a:t>
+                      </a:r>
+                      <a:endParaRPr lang="ko-KR" altLang="en-US" sz="1400" dirty="0"/>
+                    </a:p>
+                  </a:txBody>
+                  <a:tcPr/>
+                </a:tc>
+                <a:tc>
+                  <a:txBody>
+                    <a:bodyPr/>
+                    <a:lstStyle/>
+                    <a:p>
+                      <a:pPr lvl="0">
+                        <a:buNone/>
+                      </a:pPr>
+                      <a:r>
+                        <a:rPr lang="en-US" altLang="ko-KR" sz="1600" dirty="0"/>
+                        <a:t>varchar(100)</a:t>
+                      </a:r>
+                    </a:p>
+                    <a:p>
+                      <a:pPr lvl="0">
+                        <a:buNone/>
+                      </a:pPr>
+                      <a:r>
+                        <a:rPr lang="en-US" altLang="ko-KR" sz="1600" dirty="0" err="1"/>
+                        <a:t>Notnull</a:t>
+                      </a:r>
+                      <a:endParaRPr lang="ko-KR" sz="1600" dirty="0"/>
+                    </a:p>
+                  </a:txBody>
+                  <a:tcPr/>
+                </a:tc>
+                <a:extLst>
+                  <a:ext uri="{0D108BD9-81ED-4DB2-BD59-A6C34878D82A}">
+                    <a16:rowId xmlns:a16="http://schemas.microsoft.com/office/drawing/2014/main" val="115353870"/>
+                  </a:ext>
+                </a:extLst>
+              </a:tr>
+              <a:tr h="383512">
+                <a:tc>
+                  <a:txBody>
+                    <a:bodyPr/>
+                    <a:lstStyle/>
+                    <a:p>
+                      <a:pPr lvl="0" algn="ctr">
+                        <a:buNone/>
+                      </a:pPr>
+                      <a:r>
+                        <a:rPr lang="en-US" altLang="ko-KR" sz="1400" dirty="0"/>
+                        <a:t>author</a:t>
+                      </a:r>
+                      <a:endParaRPr lang="ko-KR" altLang="en-US" sz="1400" dirty="0"/>
+                    </a:p>
+                  </a:txBody>
+                  <a:tcPr/>
+                </a:tc>
+                <a:tc>
+                  <a:txBody>
+                    <a:bodyPr/>
+                    <a:lstStyle/>
+                    <a:p>
+                      <a:pPr lvl="0">
+                        <a:buNone/>
+                      </a:pPr>
+                      <a:r>
+                        <a:rPr lang="en-US" altLang="ko-KR" sz="1400" dirty="0"/>
+                        <a:t>varchar(100) </a:t>
+                      </a:r>
+                      <a:r>
+                        <a:rPr lang="en-US" altLang="ko-KR" sz="1400" dirty="0" err="1"/>
+                        <a:t>Notnull</a:t>
+                      </a:r>
+                      <a:endParaRPr lang="ko-KR" altLang="en-US" sz="1400" dirty="0"/>
+                    </a:p>
+                  </a:txBody>
+                  <a:tcPr/>
+                </a:tc>
+                <a:extLst>
+                  <a:ext uri="{0D108BD9-81ED-4DB2-BD59-A6C34878D82A}">
+                    <a16:rowId xmlns:a16="http://schemas.microsoft.com/office/drawing/2014/main" val="2415112225"/>
+                  </a:ext>
+                </a:extLst>
+              </a:tr>
+              <a:tr h="383512">
+                <a:tc>
+                  <a:txBody>
+                    <a:bodyPr/>
+                    <a:lstStyle/>
+                    <a:p>
+                      <a:pPr lvl="0" algn="ctr">
+                        <a:buNone/>
+                      </a:pPr>
+                      <a:r>
+                        <a:rPr lang="en-US" altLang="ko-KR" sz="1400" dirty="0" err="1"/>
+                        <a:t>del_yn</a:t>
+                      </a:r>
+                      <a:endParaRPr lang="ko-KR" altLang="en-US" sz="1400" dirty="0"/>
+                    </a:p>
+                  </a:txBody>
+                  <a:tcPr/>
+                </a:tc>
+                <a:tc>
+                  <a:txBody>
+                    <a:bodyPr/>
+                    <a:lstStyle/>
+                    <a:p>
+                      <a:pPr lvl="0">
+                        <a:buNone/>
+                      </a:pPr>
+                      <a:r>
+                        <a:rPr lang="en-US" altLang="ko-KR" sz="1400" dirty="0"/>
+                        <a:t>Char(1)</a:t>
+                      </a:r>
+                    </a:p>
+                    <a:p>
+                      <a:pPr lvl="0">
+                        <a:buNone/>
+                      </a:pPr>
+                      <a:r>
+                        <a:rPr lang="en-US" altLang="ko-KR" sz="1400" dirty="0"/>
+                        <a:t>Default(n)</a:t>
+                      </a:r>
+                      <a:endParaRPr lang="ko-KR" altLang="en-US" sz="1400" dirty="0"/>
+                    </a:p>
+                  </a:txBody>
+                  <a:tcPr/>
+                </a:tc>
+                <a:extLst>
+                  <a:ext uri="{0D108BD9-81ED-4DB2-BD59-A6C34878D82A}">
+                    <a16:rowId xmlns:a16="http://schemas.microsoft.com/office/drawing/2014/main" val="1011080467"/>
+                  </a:ext>
+                </a:extLst>
+              </a:tr>
+              <a:tr h="383512">
+                <a:tc>
+                  <a:txBody>
+                    <a:bodyPr/>
+                    <a:lstStyle/>
+                    <a:p>
+                      <a:pPr algn="ctr" latinLnBrk="1"/>
+                      <a:r>
+                        <a:rPr lang="en-US" altLang="ko-KR" sz="1400" dirty="0" err="1"/>
+                        <a:t>checked_yn</a:t>
+                      </a:r>
+                      <a:endParaRPr lang="ko-KR" altLang="en-US" sz="1400" dirty="0"/>
+                    </a:p>
+                  </a:txBody>
+                  <a:tcPr/>
+                </a:tc>
+                <a:tc>
+                  <a:txBody>
+                    <a:bodyPr/>
+                    <a:lstStyle/>
+                    <a:p>
+                      <a:pPr latinLnBrk="1"/>
+                      <a:r>
+                        <a:rPr lang="en-US" altLang="ko-KR" sz="1400" dirty="0"/>
+                        <a:t>Char(1)</a:t>
+                      </a:r>
+                    </a:p>
+                    <a:p>
+                      <a:pPr latinLnBrk="1"/>
+                      <a:r>
+                        <a:rPr lang="en-US" altLang="ko-KR" sz="1400" dirty="0"/>
+                        <a:t>Default(n)</a:t>
+                      </a:r>
+                      <a:endParaRPr lang="ko-KR" altLang="en-US" sz="1400" dirty="0"/>
+                    </a:p>
+                  </a:txBody>
+                  <a:tcPr/>
+                </a:tc>
+                <a:extLst>
+                  <a:ext uri="{0D108BD9-81ED-4DB2-BD59-A6C34878D82A}">
+                    <a16:rowId xmlns:a16="http://schemas.microsoft.com/office/drawing/2014/main" val="1695596309"/>
+                  </a:ext>
+                </a:extLst>
+              </a:tr>
+              <a:tr h="383512">
+                <a:tc>
+                  <a:txBody>
+                    <a:bodyPr/>
+                    <a:lstStyle/>
+                    <a:p>
+                      <a:pPr lvl="0" algn="ctr">
+                        <a:buNone/>
+                      </a:pPr>
+                      <a:r>
+                        <a:rPr lang="en-US" altLang="ko-KR" sz="1400" dirty="0" err="1"/>
+                        <a:t>create_date_time</a:t>
+                      </a:r>
+                      <a:endParaRPr lang="ko-KR" altLang="en-US" sz="1400" dirty="0"/>
+                    </a:p>
+                  </a:txBody>
+                  <a:tcPr/>
+                </a:tc>
+                <a:tc>
+                  <a:txBody>
+                    <a:bodyPr/>
+                    <a:lstStyle/>
+                    <a:p>
+                      <a:pPr lvl="0">
+                        <a:buNone/>
+                      </a:pPr>
+                      <a:r>
+                        <a:rPr lang="en-US" altLang="ko-KR" sz="1400" dirty="0"/>
+                        <a:t>Datetime(6)</a:t>
+                      </a:r>
+                      <a:endParaRPr lang="ko-KR" altLang="en-US" sz="1400" dirty="0"/>
+                    </a:p>
+                  </a:txBody>
+                  <a:tcPr/>
+                </a:tc>
+                <a:extLst>
+                  <a:ext uri="{0D108BD9-81ED-4DB2-BD59-A6C34878D82A}">
+                    <a16:rowId xmlns:a16="http://schemas.microsoft.com/office/drawing/2014/main" val="126999623"/>
+                  </a:ext>
+                </a:extLst>
+              </a:tr>
+              <a:tr h="383512">
+                <a:tc>
+                  <a:txBody>
+                    <a:bodyPr/>
+                    <a:lstStyle/>
+                    <a:p>
+                      <a:pPr lvl="0" algn="ctr">
+                        <a:buNone/>
+                      </a:pPr>
+                      <a:r>
+                        <a:rPr lang="en-US" altLang="ko-KR" sz="1400" dirty="0" err="1"/>
+                        <a:t>update_date_time</a:t>
+                      </a:r>
+                      <a:endParaRPr lang="ko-KR" altLang="en-US" sz="1400" dirty="0"/>
+                    </a:p>
+                  </a:txBody>
+                  <a:tcPr/>
+                </a:tc>
+                <a:tc>
+                  <a:txBody>
+                    <a:bodyPr/>
+                    <a:lstStyle/>
+                    <a:p>
+                      <a:pPr marL="0" marR="0" lvl="0" indent="0" algn="l" defTabSz="914400" rtl="0" eaLnBrk="1" fontAlgn="auto" latinLnBrk="1" hangingPunct="1">
+                        <a:lnSpc>
+                          <a:spcPct val="100000"/>
+                        </a:lnSpc>
+                        <a:spcBef>
+                          <a:spcPts val="0"/>
+                        </a:spcBef>
+                        <a:spcAft>
+                          <a:spcPts val="0"/>
+                        </a:spcAft>
+                        <a:buClrTx/>
+                        <a:buSzTx/>
+                        <a:buFontTx/>
+                        <a:buNone/>
+                        <a:tabLst/>
+                        <a:defRPr/>
+                      </a:pPr>
+                      <a:r>
+                        <a:rPr lang="en-US" altLang="ko-KR" sz="1400" dirty="0"/>
+                        <a:t>Datetime(6)</a:t>
+                      </a:r>
+                      <a:endParaRPr lang="ko-KR" altLang="en-US" sz="1400" dirty="0"/>
+                    </a:p>
+                    <a:p>
+                      <a:pPr lvl="0">
+                        <a:buNone/>
+                      </a:pPr>
+                      <a:endParaRPr lang="ko-KR" altLang="en-US" sz="1400" dirty="0"/>
+                    </a:p>
+                  </a:txBody>
+                  <a:tcPr/>
+                </a:tc>
+                <a:extLst>
+                  <a:ext uri="{0D108BD9-81ED-4DB2-BD59-A6C34878D82A}">
+                    <a16:rowId xmlns:a16="http://schemas.microsoft.com/office/drawing/2014/main" val="735347488"/>
+                  </a:ext>
+                </a:extLst>
+              </a:tr>
+              <a:tr h="383512">
+                <a:tc>
+                  <a:txBody>
+                    <a:bodyPr/>
+                    <a:lstStyle/>
+                    <a:p>
+                      <a:pPr lvl="0" algn="ctr">
+                        <a:buNone/>
+                      </a:pPr>
+                      <a:endParaRPr lang="ko-KR" altLang="en-US" sz="1400" dirty="0"/>
+                    </a:p>
+                  </a:txBody>
+                  <a:tcPr/>
+                </a:tc>
+                <a:tc>
+                  <a:txBody>
+                    <a:bodyPr/>
+                    <a:lstStyle/>
+                    <a:p>
+                      <a:pPr lvl="0">
+                        <a:buNone/>
+                      </a:pPr>
+                      <a:endParaRPr lang="ko-KR" altLang="en-US" sz="1400" dirty="0"/>
+                    </a:p>
+                  </a:txBody>
+                  <a:tcPr/>
+                </a:tc>
+                <a:extLst>
+                  <a:ext uri="{0D108BD9-81ED-4DB2-BD59-A6C34878D82A}">
+                    <a16:rowId xmlns:a16="http://schemas.microsoft.com/office/drawing/2014/main" val="3988595765"/>
+                  </a:ext>
+                </a:extLst>
+              </a:tr>
+            </a:tbl>
+          </a:graphicData>
+        </a:graphic>
+      </p:graphicFrame>
+    </p:spTree>
+    <p:extLst>
+      <p:ext uri="{BB962C8B-B14F-4D97-AF65-F5344CB8AC3E}">
+        <p14:creationId xmlns:p14="http://schemas.microsoft.com/office/powerpoint/2010/main" val="353925498"/>
       </p:ext>
     </p:extLst>
   </p:cSld>

</xml_diff>